<commit_message>
model and data cleaning in doksi
</commit_message>
<xml_diff>
--- a/doksi/Elektromos buszok Budapesten.pptx
+++ b/doksi/Elektromos buszok Budapesten.pptx
@@ -2842,8 +2842,8 @@
             </a:lnSpc>
           </a:pPr>
           <a:r>
-            <a:rPr lang="hu-HU" sz="3000" dirty="0" err="1"/>
-            <a:t>Training</a:t>
+            <a:rPr lang="en-GB" sz="3000" dirty="0"/>
+            <a:t>Validation</a:t>
           </a:r>
           <a:r>
             <a:rPr lang="hu-HU" sz="3000" dirty="0"/>
@@ -3753,8 +3753,8 @@
             <a:buChar char="•"/>
           </a:pPr>
           <a:r>
-            <a:rPr lang="hu-HU" sz="3000" kern="1200" dirty="0" err="1"/>
-            <a:t>Training</a:t>
+            <a:rPr lang="en-GB" sz="3000" kern="1200" dirty="0"/>
+            <a:t>Validation</a:t>
           </a:r>
           <a:r>
             <a:rPr lang="hu-HU" sz="3000" kern="1200" dirty="0"/>
@@ -14112,7 +14112,15 @@
                   <a:schemeClr val="bg1"/>
                 </a:solidFill>
               </a:rPr>
-              <a:t>ármű</a:t>
+              <a:t>árműtípu</a:t>
+            </a:r>
+            <a:r>
+              <a:rPr lang="en-GB" sz="2000" dirty="0">
+                <a:solidFill>
+                  <a:schemeClr val="bg1"/>
+                </a:solidFill>
+              </a:rPr>
+              <a:t>s</a:t>
             </a:r>
             <a:r>
               <a:rPr lang="hu-HU" sz="2000" dirty="0">
@@ -14120,23 +14128,7 @@
                   <a:schemeClr val="bg1"/>
                 </a:solidFill>
               </a:rPr>
-              <a:t> </a:t>
-            </a:r>
-            <a:r>
-              <a:rPr lang="hu-HU" sz="2000" dirty="0" err="1">
-                <a:solidFill>
-                  <a:schemeClr val="bg1"/>
-                </a:solidFill>
-              </a:rPr>
-              <a:t>típuok</a:t>
-            </a:r>
-            <a:r>
-              <a:rPr lang="hu-HU" sz="2000" dirty="0">
-                <a:solidFill>
-                  <a:schemeClr val="bg1"/>
-                </a:solidFill>
-              </a:rPr>
-              <a:t> hozzáadása</a:t>
+              <a:t>ok hozzáadása</a:t>
             </a:r>
             <a:endParaRPr lang="en-GB" sz="2000" dirty="0">
               <a:solidFill>
@@ -15611,7 +15603,7 @@
             <p:ph idx="1"/>
             <p:extLst>
               <p:ext uri="{D42A27DB-BD31-4B8C-83A1-F6EECF244321}">
-                <p14:modId xmlns:p14="http://schemas.microsoft.com/office/powerpoint/2010/main" val="2154260907"/>
+                <p14:modId xmlns:p14="http://schemas.microsoft.com/office/powerpoint/2010/main" val="55221325"/>
               </p:ext>
             </p:extLst>
           </p:nvPr>

</xml_diff>